<commit_message>
- Added Splash Screen - Added New Machine Learning predictor - Added About Form - Added icons on each menus - Bug fix
</commit_message>
<xml_diff>
--- a/Resources/Design/App_Icon.pptx
+++ b/Resources/Design/App_Icon.pptx
@@ -5,7 +5,9 @@
     <p:sldMasterId id="2147483648" r:id="rId1"/>
   </p:sldMasterIdLst>
   <p:sldIdLst>
-    <p:sldId id="256" r:id="rId2"/>
+    <p:sldId id="257" r:id="rId2"/>
+    <p:sldId id="258" r:id="rId3"/>
+    <p:sldId id="256" r:id="rId4"/>
   </p:sldIdLst>
   <p:sldSz cx="12192000" cy="6858000"/>
   <p:notesSz cx="6858000" cy="9144000"/>
@@ -104,6 +106,11 @@
       </a:defRPr>
     </a:lvl9pPr>
   </p:defaultTextStyle>
+  <p:extLst>
+    <p:ext uri="{EFAFB233-063F-42B5-8137-9DF3F51BA10A}">
+      <p15:sldGuideLst xmlns:p15="http://schemas.microsoft.com/office/powerpoint/2012/main"/>
+    </p:ext>
+  </p:extLst>
 </p:presentation>
 </file>
 
@@ -256,7 +263,7 @@
           <a:p>
             <a:fld id="{DFF8A80F-08CC-4C92-AF06-DA661B508E62}" type="datetimeFigureOut">
               <a:rPr lang="en-PH" smtClean="0"/>
-              <a:t>05/01/2021</a:t>
+              <a:t>24/03/2021</a:t>
             </a:fld>
             <a:endParaRPr lang="en-PH"/>
           </a:p>
@@ -456,7 +463,7 @@
           <a:p>
             <a:fld id="{DFF8A80F-08CC-4C92-AF06-DA661B508E62}" type="datetimeFigureOut">
               <a:rPr lang="en-PH" smtClean="0"/>
-              <a:t>05/01/2021</a:t>
+              <a:t>24/03/2021</a:t>
             </a:fld>
             <a:endParaRPr lang="en-PH"/>
           </a:p>
@@ -666,7 +673,7 @@
           <a:p>
             <a:fld id="{DFF8A80F-08CC-4C92-AF06-DA661B508E62}" type="datetimeFigureOut">
               <a:rPr lang="en-PH" smtClean="0"/>
-              <a:t>05/01/2021</a:t>
+              <a:t>24/03/2021</a:t>
             </a:fld>
             <a:endParaRPr lang="en-PH"/>
           </a:p>
@@ -866,7 +873,7 @@
           <a:p>
             <a:fld id="{DFF8A80F-08CC-4C92-AF06-DA661B508E62}" type="datetimeFigureOut">
               <a:rPr lang="en-PH" smtClean="0"/>
-              <a:t>05/01/2021</a:t>
+              <a:t>24/03/2021</a:t>
             </a:fld>
             <a:endParaRPr lang="en-PH"/>
           </a:p>
@@ -1142,7 +1149,7 @@
           <a:p>
             <a:fld id="{DFF8A80F-08CC-4C92-AF06-DA661B508E62}" type="datetimeFigureOut">
               <a:rPr lang="en-PH" smtClean="0"/>
-              <a:t>05/01/2021</a:t>
+              <a:t>24/03/2021</a:t>
             </a:fld>
             <a:endParaRPr lang="en-PH"/>
           </a:p>
@@ -1410,7 +1417,7 @@
           <a:p>
             <a:fld id="{DFF8A80F-08CC-4C92-AF06-DA661B508E62}" type="datetimeFigureOut">
               <a:rPr lang="en-PH" smtClean="0"/>
-              <a:t>05/01/2021</a:t>
+              <a:t>24/03/2021</a:t>
             </a:fld>
             <a:endParaRPr lang="en-PH"/>
           </a:p>
@@ -1825,7 +1832,7 @@
           <a:p>
             <a:fld id="{DFF8A80F-08CC-4C92-AF06-DA661B508E62}" type="datetimeFigureOut">
               <a:rPr lang="en-PH" smtClean="0"/>
-              <a:t>05/01/2021</a:t>
+              <a:t>24/03/2021</a:t>
             </a:fld>
             <a:endParaRPr lang="en-PH"/>
           </a:p>
@@ -1967,7 +1974,7 @@
           <a:p>
             <a:fld id="{DFF8A80F-08CC-4C92-AF06-DA661B508E62}" type="datetimeFigureOut">
               <a:rPr lang="en-PH" smtClean="0"/>
-              <a:t>05/01/2021</a:t>
+              <a:t>24/03/2021</a:t>
             </a:fld>
             <a:endParaRPr lang="en-PH"/>
           </a:p>
@@ -2080,7 +2087,7 @@
           <a:p>
             <a:fld id="{DFF8A80F-08CC-4C92-AF06-DA661B508E62}" type="datetimeFigureOut">
               <a:rPr lang="en-PH" smtClean="0"/>
-              <a:t>05/01/2021</a:t>
+              <a:t>24/03/2021</a:t>
             </a:fld>
             <a:endParaRPr lang="en-PH"/>
           </a:p>
@@ -2393,7 +2400,7 @@
           <a:p>
             <a:fld id="{DFF8A80F-08CC-4C92-AF06-DA661B508E62}" type="datetimeFigureOut">
               <a:rPr lang="en-PH" smtClean="0"/>
-              <a:t>05/01/2021</a:t>
+              <a:t>24/03/2021</a:t>
             </a:fld>
             <a:endParaRPr lang="en-PH"/>
           </a:p>
@@ -2682,7 +2689,7 @@
           <a:p>
             <a:fld id="{DFF8A80F-08CC-4C92-AF06-DA661B508E62}" type="datetimeFigureOut">
               <a:rPr lang="en-PH" smtClean="0"/>
-              <a:t>05/01/2021</a:t>
+              <a:t>24/03/2021</a:t>
             </a:fld>
             <a:endParaRPr lang="en-PH"/>
           </a:p>
@@ -2925,7 +2932,7 @@
           <a:p>
             <a:fld id="{DFF8A80F-08CC-4C92-AF06-DA661B508E62}" type="datetimeFigureOut">
               <a:rPr lang="en-PH" smtClean="0"/>
-              <a:t>05/01/2021</a:t>
+              <a:t>24/03/2021</a:t>
             </a:fld>
             <a:endParaRPr lang="en-PH"/>
           </a:p>
@@ -3344,6 +3351,282 @@
       </p:grpSpPr>
       <p:pic>
         <p:nvPicPr>
+          <p:cNvPr id="4" name="Picture 3">
+            <a:extLst>
+              <a:ext uri="{FF2B5EF4-FFF2-40B4-BE49-F238E27FC236}">
+                <a16:creationId xmlns:a16="http://schemas.microsoft.com/office/drawing/2014/main" id="{C170C472-09A5-44CB-BFC4-5CFD3A1C085F}"/>
+              </a:ext>
+            </a:extLst>
+          </p:cNvPr>
+          <p:cNvPicPr>
+            <a:picLocks noChangeAspect="1"/>
+          </p:cNvPicPr>
+          <p:nvPr/>
+        </p:nvPicPr>
+        <p:blipFill>
+          <a:blip r:embed="rId2">
+            <a:extLst>
+              <a:ext uri="{BEBA8EAE-BF5A-486C-A8C5-ECC9F3942E4B}">
+                <a14:imgProps xmlns:a14="http://schemas.microsoft.com/office/drawing/2010/main">
+                  <a14:imgLayer r:embed="rId3">
+                    <a14:imgEffect>
+                      <a14:colorTemperature colorTemp="11200"/>
+                    </a14:imgEffect>
+                  </a14:imgLayer>
+                </a14:imgProps>
+              </a:ext>
+              <a:ext uri="{28A0092B-C50C-407E-A947-70E740481C1C}">
+                <a14:useLocalDpi xmlns:a14="http://schemas.microsoft.com/office/drawing/2010/main" val="0"/>
+              </a:ext>
+            </a:extLst>
+          </a:blip>
+          <a:stretch>
+            <a:fillRect/>
+          </a:stretch>
+        </p:blipFill>
+        <p:spPr>
+          <a:xfrm>
+            <a:off x="3057833" y="534062"/>
+            <a:ext cx="3805084" cy="3736831"/>
+          </a:xfrm>
+          <a:prstGeom prst="rect">
+            <a:avLst/>
+          </a:prstGeom>
+          <a:ln>
+            <a:noFill/>
+          </a:ln>
+          <a:effectLst>
+            <a:outerShdw blurRad="190500" algn="tl" rotWithShape="0">
+              <a:srgbClr val="000000">
+                <a:alpha val="70000"/>
+              </a:srgbClr>
+            </a:outerShdw>
+          </a:effectLst>
+        </p:spPr>
+      </p:pic>
+    </p:spTree>
+    <p:extLst>
+      <p:ext uri="{BB962C8B-B14F-4D97-AF65-F5344CB8AC3E}">
+        <p14:creationId xmlns:p14="http://schemas.microsoft.com/office/powerpoint/2010/main" val="69735054"/>
+      </p:ext>
+    </p:extLst>
+  </p:cSld>
+  <p:clrMapOvr>
+    <a:masterClrMapping/>
+  </p:clrMapOvr>
+</p:sld>
+</file>
+
+<file path=ppt/slides/slide2.xml><?xml version="1.0" encoding="utf-8"?>
+<p:sld xmlns:a="http://schemas.openxmlformats.org/drawingml/2006/main" xmlns:r="http://schemas.openxmlformats.org/officeDocument/2006/relationships" xmlns:p="http://schemas.openxmlformats.org/presentationml/2006/main">
+  <p:cSld>
+    <p:spTree>
+      <p:nvGrpSpPr>
+        <p:cNvPr id="1" name=""/>
+        <p:cNvGrpSpPr/>
+        <p:nvPr/>
+      </p:nvGrpSpPr>
+      <p:grpSpPr>
+        <a:xfrm>
+          <a:off x="0" y="0"/>
+          <a:ext cx="0" cy="0"/>
+          <a:chOff x="0" y="0"/>
+          <a:chExt cx="0" cy="0"/>
+        </a:xfrm>
+      </p:grpSpPr>
+      <p:sp>
+        <p:nvSpPr>
+          <p:cNvPr id="8" name="Rectangle 7">
+            <a:extLst>
+              <a:ext uri="{FF2B5EF4-FFF2-40B4-BE49-F238E27FC236}">
+                <a16:creationId xmlns:a16="http://schemas.microsoft.com/office/drawing/2014/main" id="{4A916901-5357-4A4E-87F2-7C8C07C19417}"/>
+              </a:ext>
+            </a:extLst>
+          </p:cNvPr>
+          <p:cNvSpPr/>
+          <p:nvPr/>
+        </p:nvSpPr>
+        <p:spPr>
+          <a:xfrm>
+            <a:off x="0" y="0"/>
+            <a:ext cx="12191977" cy="6858000"/>
+          </a:xfrm>
+          <a:prstGeom prst="rect">
+            <a:avLst/>
+          </a:prstGeom>
+        </p:spPr>
+        <p:style>
+          <a:lnRef idx="2">
+            <a:schemeClr val="accent1">
+              <a:shade val="50000"/>
+            </a:schemeClr>
+          </a:lnRef>
+          <a:fillRef idx="1">
+            <a:schemeClr val="accent1"/>
+          </a:fillRef>
+          <a:effectRef idx="0">
+            <a:schemeClr val="accent1"/>
+          </a:effectRef>
+          <a:fontRef idx="minor">
+            <a:schemeClr val="lt1"/>
+          </a:fontRef>
+        </p:style>
+        <p:txBody>
+          <a:bodyPr rtlCol="0" anchor="ctr"/>
+          <a:lstStyle/>
+          <a:p>
+            <a:pPr algn="ctr"/>
+            <a:endParaRPr lang="en-PH"/>
+          </a:p>
+        </p:txBody>
+      </p:sp>
+      <p:pic>
+        <p:nvPicPr>
+          <p:cNvPr id="6" name="Picture 5" descr="Mosaic flower design">
+            <a:extLst>
+              <a:ext uri="{FF2B5EF4-FFF2-40B4-BE49-F238E27FC236}">
+                <a16:creationId xmlns:a16="http://schemas.microsoft.com/office/drawing/2014/main" id="{7ACBDC4D-6246-411D-90C0-C415527A16C6}"/>
+              </a:ext>
+            </a:extLst>
+          </p:cNvPr>
+          <p:cNvPicPr>
+            <a:picLocks noChangeAspect="1"/>
+          </p:cNvPicPr>
+          <p:nvPr/>
+        </p:nvPicPr>
+        <p:blipFill rotWithShape="1">
+          <a:blip r:embed="rId2"/>
+          <a:srcRect t="31990" b="35081"/>
+          <a:stretch/>
+        </p:blipFill>
+        <p:spPr>
+          <a:xfrm>
+            <a:off x="0" y="3651859"/>
+            <a:ext cx="12191977" cy="3206141"/>
+          </a:xfrm>
+          <a:prstGeom prst="rect">
+            <a:avLst/>
+          </a:prstGeom>
+        </p:spPr>
+      </p:pic>
+      <p:pic>
+        <p:nvPicPr>
+          <p:cNvPr id="10" name="Picture 9" descr="Digital art of mountains with a pastel gradient filter">
+            <a:extLst>
+              <a:ext uri="{FF2B5EF4-FFF2-40B4-BE49-F238E27FC236}">
+                <a16:creationId xmlns:a16="http://schemas.microsoft.com/office/drawing/2014/main" id="{75BC29C7-68A6-438D-AE59-5D0BA7FFA742}"/>
+              </a:ext>
+            </a:extLst>
+          </p:cNvPr>
+          <p:cNvPicPr>
+            <a:picLocks noChangeAspect="1"/>
+          </p:cNvPicPr>
+          <p:nvPr/>
+        </p:nvPicPr>
+        <p:blipFill rotWithShape="1">
+          <a:blip r:embed="rId3">
+            <a:alphaModFix amt="70000"/>
+          </a:blip>
+          <a:srcRect t="15726" r="-1" b="-1"/>
+          <a:stretch/>
+        </p:blipFill>
+        <p:spPr>
+          <a:xfrm>
+            <a:off x="0" y="0"/>
+            <a:ext cx="12188932" cy="6856614"/>
+          </a:xfrm>
+          <a:prstGeom prst="rect">
+            <a:avLst/>
+          </a:prstGeom>
+        </p:spPr>
+      </p:pic>
+      <p:pic>
+        <p:nvPicPr>
+          <p:cNvPr id="7" name="Picture 6">
+            <a:extLst>
+              <a:ext uri="{FF2B5EF4-FFF2-40B4-BE49-F238E27FC236}">
+                <a16:creationId xmlns:a16="http://schemas.microsoft.com/office/drawing/2014/main" id="{ED115AE9-F274-4C73-B42F-E8861181A70B}"/>
+              </a:ext>
+            </a:extLst>
+          </p:cNvPr>
+          <p:cNvPicPr>
+            <a:picLocks noChangeAspect="1"/>
+          </p:cNvPicPr>
+          <p:nvPr/>
+        </p:nvPicPr>
+        <p:blipFill>
+          <a:blip r:embed="rId4">
+            <a:extLst>
+              <a:ext uri="{BEBA8EAE-BF5A-486C-A8C5-ECC9F3942E4B}">
+                <a14:imgProps xmlns:a14="http://schemas.microsoft.com/office/drawing/2010/main">
+                  <a14:imgLayer r:embed="rId5">
+                    <a14:imgEffect>
+                      <a14:colorTemperature colorTemp="11200"/>
+                    </a14:imgEffect>
+                  </a14:imgLayer>
+                </a14:imgProps>
+              </a:ext>
+              <a:ext uri="{28A0092B-C50C-407E-A947-70E740481C1C}">
+                <a14:useLocalDpi xmlns:a14="http://schemas.microsoft.com/office/drawing/2010/main" val="0"/>
+              </a:ext>
+            </a:extLst>
+          </a:blip>
+          <a:stretch>
+            <a:fillRect/>
+          </a:stretch>
+        </p:blipFill>
+        <p:spPr>
+          <a:xfrm>
+            <a:off x="326925" y="582548"/>
+            <a:ext cx="2532185" cy="2486764"/>
+          </a:xfrm>
+          <a:prstGeom prst="rect">
+            <a:avLst/>
+          </a:prstGeom>
+          <a:ln>
+            <a:noFill/>
+          </a:ln>
+          <a:effectLst>
+            <a:outerShdw blurRad="190500" algn="tl" rotWithShape="0">
+              <a:srgbClr val="000000">
+                <a:alpha val="70000"/>
+              </a:srgbClr>
+            </a:outerShdw>
+          </a:effectLst>
+        </p:spPr>
+      </p:pic>
+    </p:spTree>
+    <p:extLst>
+      <p:ext uri="{BB962C8B-B14F-4D97-AF65-F5344CB8AC3E}">
+        <p14:creationId xmlns:p14="http://schemas.microsoft.com/office/powerpoint/2010/main" val="2743072267"/>
+      </p:ext>
+    </p:extLst>
+  </p:cSld>
+  <p:clrMapOvr>
+    <a:masterClrMapping/>
+  </p:clrMapOvr>
+</p:sld>
+</file>
+
+<file path=ppt/slides/slide3.xml><?xml version="1.0" encoding="utf-8"?>
+<p:sld xmlns:a="http://schemas.openxmlformats.org/drawingml/2006/main" xmlns:r="http://schemas.openxmlformats.org/officeDocument/2006/relationships" xmlns:p="http://schemas.openxmlformats.org/presentationml/2006/main">
+  <p:cSld>
+    <p:spTree>
+      <p:nvGrpSpPr>
+        <p:cNvPr id="1" name=""/>
+        <p:cNvGrpSpPr/>
+        <p:nvPr/>
+      </p:nvGrpSpPr>
+      <p:grpSpPr>
+        <a:xfrm>
+          <a:off x="0" y="0"/>
+          <a:ext cx="0" cy="0"/>
+          <a:chOff x="0" y="0"/>
+          <a:chExt cx="0" cy="0"/>
+        </a:xfrm>
+      </p:grpSpPr>
+      <p:pic>
+        <p:nvPicPr>
           <p:cNvPr id="5" name="Picture 4">
             <a:extLst>
               <a:ext uri="{FF2B5EF4-FFF2-40B4-BE49-F238E27FC236}">

</xml_diff>